<commit_message>
Changes + Yii app
</commit_message>
<xml_diff>
--- a/Documentation/Soft Copies/Powerpoint/AfterLife - Midterm.pptx
+++ b/Documentation/Soft Copies/Powerpoint/AfterLife - Midterm.pptx
@@ -5,10 +5,10 @@
     <p:sldMasterId id="2147483648" r:id="rId1"/>
   </p:sldMasterIdLst>
   <p:notesMasterIdLst>
-    <p:notesMasterId r:id="rId15"/>
+    <p:notesMasterId r:id="rId24"/>
   </p:notesMasterIdLst>
   <p:handoutMasterIdLst>
-    <p:handoutMasterId r:id="rId16"/>
+    <p:handoutMasterId r:id="rId25"/>
   </p:handoutMasterIdLst>
   <p:sldIdLst>
     <p:sldId id="256" r:id="rId2"/>
@@ -24,6 +24,15 @@
     <p:sldId id="266" r:id="rId12"/>
     <p:sldId id="267" r:id="rId13"/>
     <p:sldId id="272" r:id="rId14"/>
+    <p:sldId id="279" r:id="rId15"/>
+    <p:sldId id="280" r:id="rId16"/>
+    <p:sldId id="281" r:id="rId17"/>
+    <p:sldId id="282" r:id="rId18"/>
+    <p:sldId id="283" r:id="rId19"/>
+    <p:sldId id="284" r:id="rId20"/>
+    <p:sldId id="287" r:id="rId21"/>
+    <p:sldId id="285" r:id="rId22"/>
+    <p:sldId id="286" r:id="rId23"/>
   </p:sldIdLst>
   <p:sldSz cx="12192000" cy="6858000"/>
   <p:notesSz cx="6858000" cy="9144000"/>
@@ -226,7 +235,7 @@
           <a:p>
             <a:fld id="{043B725B-653D-4166-A8E9-72A38A1847CF}" type="datetimeFigureOut">
               <a:rPr lang="en-US"/>
-              <a:t>3/10/2017</a:t>
+              <a:t>3/17/2017</a:t>
             </a:fld>
             <a:endParaRPr/>
           </a:p>
@@ -391,7 +400,7 @@
           <a:p>
             <a:fld id="{783F64CD-0576-4A9A-BD06-7889D6E60BDC}" type="datetimeFigureOut">
               <a:rPr lang="en-US"/>
-              <a:t>3/10/2017</a:t>
+              <a:t>3/17/2017</a:t>
             </a:fld>
             <a:endParaRPr/>
           </a:p>
@@ -994,7 +1003,7 @@
           <a:p>
             <a:fld id="{37CC0096-1860-4642-9CD2-0079EA5E7CD1}" type="datetimeFigureOut">
               <a:rPr lang="en-US"/>
-              <a:t>3/10/2017</a:t>
+              <a:t>3/17/2017</a:t>
             </a:fld>
             <a:endParaRPr/>
           </a:p>
@@ -1243,7 +1252,7 @@
           <a:p>
             <a:fld id="{37CC0096-1860-4642-9CD2-0079EA5E7CD1}" type="datetimeFigureOut">
               <a:rPr lang="en-US"/>
-              <a:t>3/10/2017</a:t>
+              <a:t>3/17/2017</a:t>
             </a:fld>
             <a:endParaRPr/>
           </a:p>
@@ -1429,7 +1438,7 @@
           <a:p>
             <a:fld id="{37CC0096-1860-4642-9CD2-0079EA5E7CD1}" type="datetimeFigureOut">
               <a:rPr lang="en-US"/>
-              <a:t>3/10/2017</a:t>
+              <a:t>3/17/2017</a:t>
             </a:fld>
             <a:endParaRPr/>
           </a:p>
@@ -1960,7 +1969,7 @@
           <a:p>
             <a:fld id="{37CC0096-1860-4642-9CD2-0079EA5E7CD1}" type="datetimeFigureOut">
               <a:rPr lang="en-US"/>
-              <a:t>3/10/2017</a:t>
+              <a:t>3/17/2017</a:t>
             </a:fld>
             <a:endParaRPr/>
           </a:p>
@@ -2412,7 +2421,7 @@
           <a:p>
             <a:fld id="{37CC0096-1860-4642-9CD2-0079EA5E7CD1}" type="datetimeFigureOut">
               <a:rPr lang="en-US"/>
-              <a:t>3/10/2017</a:t>
+              <a:t>3/17/2017</a:t>
             </a:fld>
             <a:endParaRPr/>
           </a:p>
@@ -2542,7 +2551,7 @@
           <a:p>
             <a:fld id="{37CC0096-1860-4642-9CD2-0079EA5E7CD1}" type="datetimeFigureOut">
               <a:rPr lang="en-US"/>
-              <a:t>3/10/2017</a:t>
+              <a:t>3/17/2017</a:t>
             </a:fld>
             <a:endParaRPr/>
           </a:p>
@@ -2649,7 +2658,7 @@
           <a:p>
             <a:fld id="{37CC0096-1860-4642-9CD2-0079EA5E7CD1}" type="datetimeFigureOut">
               <a:rPr lang="en-US"/>
-              <a:t>3/10/2017</a:t>
+              <a:t>3/17/2017</a:t>
             </a:fld>
             <a:endParaRPr/>
           </a:p>
@@ -3638,7 +3647,7 @@
             <a:fld id="{37CC0096-1860-4642-9CD2-0079EA5E7CD1}" type="datetimeFigureOut">
               <a:rPr lang="en-US" smtClean="0"/>
               <a:pPr/>
-              <a:t>3/10/2017</a:t>
+              <a:t>3/17/2017</a:t>
             </a:fld>
             <a:endParaRPr lang="en-US" dirty="0"/>
           </a:p>
@@ -5737,6 +5746,7 @@
           </a:bodyPr>
           <a:lstStyle/>
           <a:p>
+            <a:pPr lvl="0"/>
             <a:r>
               <a:rPr lang="en-US" sz="3200" dirty="0">
                 <a:solidFill>
@@ -5744,10 +5754,11 @@
                 </a:solidFill>
                 <a:latin typeface="Cambria" panose="02040503050406030204" pitchFamily="18" charset="0"/>
               </a:rPr>
-              <a:t>Volunteers’ List</a:t>
-            </a:r>
-          </a:p>
-          <a:p>
+              <a:t>Volunteers’ List and Form Inclusion</a:t>
+            </a:r>
+          </a:p>
+          <a:p>
+            <a:pPr lvl="0"/>
             <a:r>
               <a:rPr lang="en-US" sz="3200" dirty="0">
                 <a:solidFill>
@@ -5755,10 +5766,68 @@
                 </a:solidFill>
                 <a:latin typeface="Cambria" panose="02040503050406030204" pitchFamily="18" charset="0"/>
               </a:rPr>
-              <a:t>Instructions on proper body handling</a:t>
-            </a:r>
-          </a:p>
-          <a:p>
+              <a:t>Proper Body Handling Manual</a:t>
+            </a:r>
+          </a:p>
+          <a:p>
+            <a:pPr lvl="0"/>
+            <a:r>
+              <a:rPr lang="en-US" sz="3200" dirty="0">
+                <a:solidFill>
+                  <a:schemeClr val="tx1"/>
+                </a:solidFill>
+                <a:latin typeface="Cambria" panose="02040503050406030204" pitchFamily="18" charset="0"/>
+              </a:rPr>
+              <a:t>Summary of the Dead and Missing Statistics (Analytics)</a:t>
+            </a:r>
+          </a:p>
+          <a:p>
+            <a:pPr lvl="0"/>
+            <a:r>
+              <a:rPr lang="en-US" sz="3200" dirty="0">
+                <a:solidFill>
+                  <a:schemeClr val="tx1"/>
+                </a:solidFill>
+                <a:latin typeface="Cambria" panose="02040503050406030204" pitchFamily="18" charset="0"/>
+              </a:rPr>
+              <a:t>Site News</a:t>
+            </a:r>
+          </a:p>
+          <a:p>
+            <a:pPr lvl="0"/>
+            <a:r>
+              <a:rPr lang="en-US" sz="3200" dirty="0">
+                <a:solidFill>
+                  <a:schemeClr val="tx1"/>
+                </a:solidFill>
+                <a:latin typeface="Cambria" panose="02040503050406030204" pitchFamily="18" charset="0"/>
+              </a:rPr>
+              <a:t>Matchmaking of Data</a:t>
+            </a:r>
+          </a:p>
+          <a:p>
+            <a:pPr lvl="0"/>
+            <a:r>
+              <a:rPr lang="en-US" sz="3200" dirty="0">
+                <a:solidFill>
+                  <a:schemeClr val="tx1"/>
+                </a:solidFill>
+                <a:latin typeface="Cambria" panose="02040503050406030204" pitchFamily="18" charset="0"/>
+              </a:rPr>
+              <a:t>List of Makeshift Morgue</a:t>
+            </a:r>
+          </a:p>
+          <a:p>
+            <a:pPr lvl="0"/>
+            <a:r>
+              <a:rPr lang="en-US" sz="3200" dirty="0">
+                <a:solidFill>
+                  <a:schemeClr val="tx1"/>
+                </a:solidFill>
+                <a:latin typeface="Cambria" panose="02040503050406030204" pitchFamily="18" charset="0"/>
+              </a:rPr>
+              <a:t>Transportation </a:t>
+            </a:r>
             <a:r>
               <a:rPr lang="en-US" sz="3200" dirty="0" smtClean="0">
                 <a:solidFill>
@@ -5766,61 +5835,8 @@
                 </a:solidFill>
                 <a:latin typeface="Cambria" panose="02040503050406030204" pitchFamily="18" charset="0"/>
               </a:rPr>
-              <a:t>Post </a:t>
-            </a:r>
-            <a:r>
-              <a:rPr lang="en-US" sz="3200" dirty="0">
-                <a:solidFill>
-                  <a:schemeClr val="tx1"/>
-                </a:solidFill>
-                <a:latin typeface="Cambria" panose="02040503050406030204" pitchFamily="18" charset="0"/>
-              </a:rPr>
-              <a:t>Validation</a:t>
-            </a:r>
-          </a:p>
-          <a:p>
-            <a:r>
-              <a:rPr lang="en-US" sz="3200" dirty="0">
-                <a:solidFill>
-                  <a:schemeClr val="tx1"/>
-                </a:solidFill>
-                <a:latin typeface="Cambria" panose="02040503050406030204" pitchFamily="18" charset="0"/>
-              </a:rPr>
-              <a:t>Missing/Dead Persons Tally</a:t>
-            </a:r>
-          </a:p>
-          <a:p>
-            <a:r>
-              <a:rPr lang="en-US" sz="3200" dirty="0" smtClean="0">
-                <a:solidFill>
-                  <a:schemeClr val="tx1"/>
-                </a:solidFill>
-                <a:latin typeface="Cambria" panose="02040503050406030204" pitchFamily="18" charset="0"/>
-              </a:rPr>
-              <a:t>Site News</a:t>
-            </a:r>
-          </a:p>
-          <a:p>
-            <a:r>
-              <a:rPr lang="en-US" sz="3200" dirty="0" smtClean="0">
-                <a:solidFill>
-                  <a:schemeClr val="tx1"/>
-                </a:solidFill>
-                <a:latin typeface="Cambria" panose="02040503050406030204" pitchFamily="18" charset="0"/>
-              </a:rPr>
-              <a:t>Matchmaking	of Data</a:t>
-            </a:r>
-            <a:endParaRPr lang="en-US" sz="3200" dirty="0">
-              <a:solidFill>
-                <a:schemeClr val="tx1"/>
-              </a:solidFill>
-              <a:latin typeface="Cambria" panose="02040503050406030204" pitchFamily="18" charset="0"/>
-            </a:endParaRPr>
-          </a:p>
-          <a:p>
-            <a:pPr marL="0" indent="0">
-              <a:buNone/>
-            </a:pPr>
+              <a:t>Request</a:t>
+            </a:r>
             <a:endParaRPr lang="en-US" sz="3200" dirty="0">
               <a:solidFill>
                 <a:schemeClr val="tx1"/>
@@ -6521,6 +6537,121 @@
                                           <p:spTgt spid="3">
                                             <p:txEl>
                                               <p:pRg st="5" end="5"/>
+                                            </p:txEl>
+                                          </p:spTgt>
+                                        </p:tgtEl>
+                                        <p:attrNameLst>
+                                          <p:attrName>ppt_y</p:attrName>
+                                        </p:attrNameLst>
+                                      </p:cBhvr>
+                                      <p:tavLst>
+                                        <p:tav tm="0">
+                                          <p:val>
+                                            <p:strVal val="#ppt_y+.1"/>
+                                          </p:val>
+                                        </p:tav>
+                                        <p:tav tm="100000">
+                                          <p:val>
+                                            <p:strVal val="#ppt_y"/>
+                                          </p:val>
+                                        </p:tav>
+                                      </p:tavLst>
+                                    </p:anim>
+                                  </p:childTnLst>
+                                </p:cTn>
+                              </p:par>
+                            </p:childTnLst>
+                          </p:cTn>
+                        </p:par>
+                      </p:childTnLst>
+                    </p:cTn>
+                  </p:par>
+                  <p:par>
+                    <p:cTn id="45" fill="hold">
+                      <p:stCondLst>
+                        <p:cond delay="indefinite"/>
+                      </p:stCondLst>
+                      <p:childTnLst>
+                        <p:par>
+                          <p:cTn id="46" fill="hold">
+                            <p:stCondLst>
+                              <p:cond delay="0"/>
+                            </p:stCondLst>
+                            <p:childTnLst>
+                              <p:par>
+                                <p:cTn id="47" presetID="42" presetClass="entr" presetSubtype="0" fill="hold" nodeType="clickEffect">
+                                  <p:stCondLst>
+                                    <p:cond delay="0"/>
+                                  </p:stCondLst>
+                                  <p:childTnLst>
+                                    <p:set>
+                                      <p:cBhvr>
+                                        <p:cTn id="48" dur="1" fill="hold">
+                                          <p:stCondLst>
+                                            <p:cond delay="0"/>
+                                          </p:stCondLst>
+                                        </p:cTn>
+                                        <p:tgtEl>
+                                          <p:spTgt spid="3">
+                                            <p:txEl>
+                                              <p:pRg st="6" end="6"/>
+                                            </p:txEl>
+                                          </p:spTgt>
+                                        </p:tgtEl>
+                                        <p:attrNameLst>
+                                          <p:attrName>style.visibility</p:attrName>
+                                        </p:attrNameLst>
+                                      </p:cBhvr>
+                                      <p:to>
+                                        <p:strVal val="visible"/>
+                                      </p:to>
+                                    </p:set>
+                                    <p:animEffect transition="in" filter="fade">
+                                      <p:cBhvr>
+                                        <p:cTn id="49" dur="1000"/>
+                                        <p:tgtEl>
+                                          <p:spTgt spid="3">
+                                            <p:txEl>
+                                              <p:pRg st="6" end="6"/>
+                                            </p:txEl>
+                                          </p:spTgt>
+                                        </p:tgtEl>
+                                      </p:cBhvr>
+                                    </p:animEffect>
+                                    <p:anim calcmode="lin" valueType="num">
+                                      <p:cBhvr>
+                                        <p:cTn id="50" dur="1000" fill="hold"/>
+                                        <p:tgtEl>
+                                          <p:spTgt spid="3">
+                                            <p:txEl>
+                                              <p:pRg st="6" end="6"/>
+                                            </p:txEl>
+                                          </p:spTgt>
+                                        </p:tgtEl>
+                                        <p:attrNameLst>
+                                          <p:attrName>ppt_x</p:attrName>
+                                        </p:attrNameLst>
+                                      </p:cBhvr>
+                                      <p:tavLst>
+                                        <p:tav tm="0">
+                                          <p:val>
+                                            <p:strVal val="#ppt_x"/>
+                                          </p:val>
+                                        </p:tav>
+                                        <p:tav tm="100000">
+                                          <p:val>
+                                            <p:strVal val="#ppt_x"/>
+                                          </p:val>
+                                        </p:tav>
+                                      </p:tavLst>
+                                    </p:anim>
+                                    <p:anim calcmode="lin" valueType="num">
+                                      <p:cBhvr>
+                                        <p:cTn id="51" dur="1000" fill="hold"/>
+                                        <p:tgtEl>
+                                          <p:spTgt spid="3">
+                                            <p:txEl>
+                                              <p:pRg st="6" end="6"/>
                                             </p:txEl>
                                           </p:spTgt>
                                         </p:tgtEl>
@@ -6656,6 +6787,438 @@
 </p:sld>
 </file>
 
+<file path=ppt/slides/slide14.xml><?xml version="1.0" encoding="utf-8"?>
+<p:sld xmlns:a="http://schemas.openxmlformats.org/drawingml/2006/main" xmlns:r="http://schemas.openxmlformats.org/officeDocument/2006/relationships" xmlns:p="http://schemas.openxmlformats.org/presentationml/2006/main">
+  <p:cSld>
+    <p:spTree>
+      <p:nvGrpSpPr>
+        <p:cNvPr id="1" name=""/>
+        <p:cNvGrpSpPr/>
+        <p:nvPr/>
+      </p:nvGrpSpPr>
+      <p:grpSpPr>
+        <a:xfrm>
+          <a:off x="0" y="0"/>
+          <a:ext cx="0" cy="0"/>
+          <a:chOff x="0" y="0"/>
+          <a:chExt cx="0" cy="0"/>
+        </a:xfrm>
+      </p:grpSpPr>
+      <p:pic>
+        <p:nvPicPr>
+          <p:cNvPr id="6" name="Picture 5"/>
+          <p:cNvPicPr>
+            <a:picLocks noChangeAspect="1"/>
+          </p:cNvPicPr>
+          <p:nvPr/>
+        </p:nvPicPr>
+        <p:blipFill>
+          <a:blip r:embed="rId2">
+            <a:extLst>
+              <a:ext uri="{28A0092B-C50C-407E-A947-70E740481C1C}">
+                <a14:useLocalDpi xmlns:a14="http://schemas.microsoft.com/office/drawing/2010/main" val="0"/>
+              </a:ext>
+            </a:extLst>
+          </a:blip>
+          <a:stretch>
+            <a:fillRect/>
+          </a:stretch>
+        </p:blipFill>
+        <p:spPr>
+          <a:xfrm>
+            <a:off x="152400" y="152400"/>
+            <a:ext cx="11811000" cy="6616630"/>
+          </a:xfrm>
+          <a:prstGeom prst="rect">
+            <a:avLst/>
+          </a:prstGeom>
+        </p:spPr>
+      </p:pic>
+    </p:spTree>
+    <p:extLst>
+      <p:ext uri="{BB962C8B-B14F-4D97-AF65-F5344CB8AC3E}">
+        <p14:creationId xmlns:p14="http://schemas.microsoft.com/office/powerpoint/2010/main" val="3828628574"/>
+      </p:ext>
+    </p:extLst>
+  </p:cSld>
+  <p:clrMapOvr>
+    <a:masterClrMapping/>
+  </p:clrMapOvr>
+  <mc:AlternateContent xmlns:mc="http://schemas.openxmlformats.org/markup-compatibility/2006" xmlns:p14="http://schemas.microsoft.com/office/powerpoint/2010/main">
+    <mc:Choice Requires="p14">
+      <p:transition spd="med" p14:dur="700">
+        <p:fade/>
+      </p:transition>
+    </mc:Choice>
+    <mc:Fallback xmlns="">
+      <p:transition spd="med">
+        <p:fade/>
+      </p:transition>
+    </mc:Fallback>
+  </mc:AlternateContent>
+</p:sld>
+</file>
+
+<file path=ppt/slides/slide15.xml><?xml version="1.0" encoding="utf-8"?>
+<p:sld xmlns:a="http://schemas.openxmlformats.org/drawingml/2006/main" xmlns:r="http://schemas.openxmlformats.org/officeDocument/2006/relationships" xmlns:p="http://schemas.openxmlformats.org/presentationml/2006/main">
+  <p:cSld>
+    <p:spTree>
+      <p:nvGrpSpPr>
+        <p:cNvPr id="1" name=""/>
+        <p:cNvGrpSpPr/>
+        <p:nvPr/>
+      </p:nvGrpSpPr>
+      <p:grpSpPr>
+        <a:xfrm>
+          <a:off x="0" y="0"/>
+          <a:ext cx="0" cy="0"/>
+          <a:chOff x="0" y="0"/>
+          <a:chExt cx="0" cy="0"/>
+        </a:xfrm>
+      </p:grpSpPr>
+      <p:pic>
+        <p:nvPicPr>
+          <p:cNvPr id="2" name="Picture 1"/>
+          <p:cNvPicPr>
+            <a:picLocks noChangeAspect="1"/>
+          </p:cNvPicPr>
+          <p:nvPr/>
+        </p:nvPicPr>
+        <p:blipFill>
+          <a:blip r:embed="rId2">
+            <a:extLst>
+              <a:ext uri="{28A0092B-C50C-407E-A947-70E740481C1C}">
+                <a14:useLocalDpi xmlns:a14="http://schemas.microsoft.com/office/drawing/2010/main" val="0"/>
+              </a:ext>
+            </a:extLst>
+          </a:blip>
+          <a:stretch>
+            <a:fillRect/>
+          </a:stretch>
+        </p:blipFill>
+        <p:spPr>
+          <a:xfrm>
+            <a:off x="1676400" y="33528"/>
+            <a:ext cx="8991600" cy="6705600"/>
+          </a:xfrm>
+          <a:prstGeom prst="rect">
+            <a:avLst/>
+          </a:prstGeom>
+        </p:spPr>
+      </p:pic>
+    </p:spTree>
+    <p:extLst>
+      <p:ext uri="{BB962C8B-B14F-4D97-AF65-F5344CB8AC3E}">
+        <p14:creationId xmlns:p14="http://schemas.microsoft.com/office/powerpoint/2010/main" val="2793485930"/>
+      </p:ext>
+    </p:extLst>
+  </p:cSld>
+  <p:clrMapOvr>
+    <a:masterClrMapping/>
+  </p:clrMapOvr>
+  <mc:AlternateContent xmlns:mc="http://schemas.openxmlformats.org/markup-compatibility/2006" xmlns:p14="http://schemas.microsoft.com/office/powerpoint/2010/main">
+    <mc:Choice Requires="p14">
+      <p:transition spd="med" p14:dur="700">
+        <p:fade/>
+      </p:transition>
+    </mc:Choice>
+    <mc:Fallback xmlns="">
+      <p:transition spd="med">
+        <p:fade/>
+      </p:transition>
+    </mc:Fallback>
+  </mc:AlternateContent>
+</p:sld>
+</file>
+
+<file path=ppt/slides/slide16.xml><?xml version="1.0" encoding="utf-8"?>
+<p:sld xmlns:a="http://schemas.openxmlformats.org/drawingml/2006/main" xmlns:r="http://schemas.openxmlformats.org/officeDocument/2006/relationships" xmlns:p="http://schemas.openxmlformats.org/presentationml/2006/main">
+  <p:cSld>
+    <p:spTree>
+      <p:nvGrpSpPr>
+        <p:cNvPr id="1" name=""/>
+        <p:cNvGrpSpPr/>
+        <p:nvPr/>
+      </p:nvGrpSpPr>
+      <p:grpSpPr>
+        <a:xfrm>
+          <a:off x="0" y="0"/>
+          <a:ext cx="0" cy="0"/>
+          <a:chOff x="0" y="0"/>
+          <a:chExt cx="0" cy="0"/>
+        </a:xfrm>
+      </p:grpSpPr>
+      <p:pic>
+        <p:nvPicPr>
+          <p:cNvPr id="2" name="Picture 1"/>
+          <p:cNvPicPr>
+            <a:picLocks noChangeAspect="1"/>
+          </p:cNvPicPr>
+          <p:nvPr/>
+        </p:nvPicPr>
+        <p:blipFill>
+          <a:blip r:embed="rId2">
+            <a:extLst>
+              <a:ext uri="{28A0092B-C50C-407E-A947-70E740481C1C}">
+                <a14:useLocalDpi xmlns:a14="http://schemas.microsoft.com/office/drawing/2010/main" val="0"/>
+              </a:ext>
+            </a:extLst>
+          </a:blip>
+          <a:stretch>
+            <a:fillRect/>
+          </a:stretch>
+        </p:blipFill>
+        <p:spPr>
+          <a:xfrm>
+            <a:off x="762000" y="228600"/>
+            <a:ext cx="10744199" cy="6520885"/>
+          </a:xfrm>
+          <a:prstGeom prst="rect">
+            <a:avLst/>
+          </a:prstGeom>
+        </p:spPr>
+      </p:pic>
+    </p:spTree>
+    <p:extLst>
+      <p:ext uri="{BB962C8B-B14F-4D97-AF65-F5344CB8AC3E}">
+        <p14:creationId xmlns:p14="http://schemas.microsoft.com/office/powerpoint/2010/main" val="164167973"/>
+      </p:ext>
+    </p:extLst>
+  </p:cSld>
+  <p:clrMapOvr>
+    <a:masterClrMapping/>
+  </p:clrMapOvr>
+  <mc:AlternateContent xmlns:mc="http://schemas.openxmlformats.org/markup-compatibility/2006" xmlns:p14="http://schemas.microsoft.com/office/powerpoint/2010/main">
+    <mc:Choice Requires="p14">
+      <p:transition spd="med" p14:dur="700">
+        <p:fade/>
+      </p:transition>
+    </mc:Choice>
+    <mc:Fallback xmlns="">
+      <p:transition spd="med">
+        <p:fade/>
+      </p:transition>
+    </mc:Fallback>
+  </mc:AlternateContent>
+</p:sld>
+</file>
+
+<file path=ppt/slides/slide17.xml><?xml version="1.0" encoding="utf-8"?>
+<p:sld xmlns:a="http://schemas.openxmlformats.org/drawingml/2006/main" xmlns:r="http://schemas.openxmlformats.org/officeDocument/2006/relationships" xmlns:p="http://schemas.openxmlformats.org/presentationml/2006/main">
+  <p:cSld>
+    <p:spTree>
+      <p:nvGrpSpPr>
+        <p:cNvPr id="1" name=""/>
+        <p:cNvGrpSpPr/>
+        <p:nvPr/>
+      </p:nvGrpSpPr>
+      <p:grpSpPr>
+        <a:xfrm>
+          <a:off x="0" y="0"/>
+          <a:ext cx="0" cy="0"/>
+          <a:chOff x="0" y="0"/>
+          <a:chExt cx="0" cy="0"/>
+        </a:xfrm>
+      </p:grpSpPr>
+      <p:pic>
+        <p:nvPicPr>
+          <p:cNvPr id="2" name="Picture 1"/>
+          <p:cNvPicPr>
+            <a:picLocks noChangeAspect="1"/>
+          </p:cNvPicPr>
+          <p:nvPr/>
+        </p:nvPicPr>
+        <p:blipFill>
+          <a:blip r:embed="rId2">
+            <a:extLst>
+              <a:ext uri="{28A0092B-C50C-407E-A947-70E740481C1C}">
+                <a14:useLocalDpi xmlns:a14="http://schemas.microsoft.com/office/drawing/2010/main" val="0"/>
+              </a:ext>
+            </a:extLst>
+          </a:blip>
+          <a:stretch>
+            <a:fillRect/>
+          </a:stretch>
+        </p:blipFill>
+        <p:spPr>
+          <a:xfrm>
+            <a:off x="2209800" y="128016"/>
+            <a:ext cx="7493681" cy="6705600"/>
+          </a:xfrm>
+          <a:prstGeom prst="rect">
+            <a:avLst/>
+          </a:prstGeom>
+        </p:spPr>
+      </p:pic>
+    </p:spTree>
+    <p:extLst>
+      <p:ext uri="{BB962C8B-B14F-4D97-AF65-F5344CB8AC3E}">
+        <p14:creationId xmlns:p14="http://schemas.microsoft.com/office/powerpoint/2010/main" val="3325112482"/>
+      </p:ext>
+    </p:extLst>
+  </p:cSld>
+  <p:clrMapOvr>
+    <a:masterClrMapping/>
+  </p:clrMapOvr>
+  <mc:AlternateContent xmlns:mc="http://schemas.openxmlformats.org/markup-compatibility/2006" xmlns:p14="http://schemas.microsoft.com/office/powerpoint/2010/main">
+    <mc:Choice Requires="p14">
+      <p:transition spd="med" p14:dur="700">
+        <p:fade/>
+      </p:transition>
+    </mc:Choice>
+    <mc:Fallback xmlns="">
+      <p:transition spd="med">
+        <p:fade/>
+      </p:transition>
+    </mc:Fallback>
+  </mc:AlternateContent>
+</p:sld>
+</file>
+
+<file path=ppt/slides/slide18.xml><?xml version="1.0" encoding="utf-8"?>
+<p:sld xmlns:a="http://schemas.openxmlformats.org/drawingml/2006/main" xmlns:r="http://schemas.openxmlformats.org/officeDocument/2006/relationships" xmlns:p="http://schemas.openxmlformats.org/presentationml/2006/main">
+  <p:cSld>
+    <p:spTree>
+      <p:nvGrpSpPr>
+        <p:cNvPr id="1" name=""/>
+        <p:cNvGrpSpPr/>
+        <p:nvPr/>
+      </p:nvGrpSpPr>
+      <p:grpSpPr>
+        <a:xfrm>
+          <a:off x="0" y="0"/>
+          <a:ext cx="0" cy="0"/>
+          <a:chOff x="0" y="0"/>
+          <a:chExt cx="0" cy="0"/>
+        </a:xfrm>
+      </p:grpSpPr>
+      <p:pic>
+        <p:nvPicPr>
+          <p:cNvPr id="2" name="Picture 1"/>
+          <p:cNvPicPr>
+            <a:picLocks noChangeAspect="1"/>
+          </p:cNvPicPr>
+          <p:nvPr/>
+        </p:nvPicPr>
+        <p:blipFill>
+          <a:blip r:embed="rId2">
+            <a:extLst>
+              <a:ext uri="{28A0092B-C50C-407E-A947-70E740481C1C}">
+                <a14:useLocalDpi xmlns:a14="http://schemas.microsoft.com/office/drawing/2010/main" val="0"/>
+              </a:ext>
+            </a:extLst>
+          </a:blip>
+          <a:stretch>
+            <a:fillRect/>
+          </a:stretch>
+        </p:blipFill>
+        <p:spPr>
+          <a:xfrm>
+            <a:off x="2438400" y="27432"/>
+            <a:ext cx="7467600" cy="6627150"/>
+          </a:xfrm>
+          <a:prstGeom prst="rect">
+            <a:avLst/>
+          </a:prstGeom>
+        </p:spPr>
+      </p:pic>
+    </p:spTree>
+    <p:extLst>
+      <p:ext uri="{BB962C8B-B14F-4D97-AF65-F5344CB8AC3E}">
+        <p14:creationId xmlns:p14="http://schemas.microsoft.com/office/powerpoint/2010/main" val="1922456751"/>
+      </p:ext>
+    </p:extLst>
+  </p:cSld>
+  <p:clrMapOvr>
+    <a:masterClrMapping/>
+  </p:clrMapOvr>
+  <mc:AlternateContent xmlns:mc="http://schemas.openxmlformats.org/markup-compatibility/2006" xmlns:p14="http://schemas.microsoft.com/office/powerpoint/2010/main">
+    <mc:Choice Requires="p14">
+      <p:transition spd="med" p14:dur="700">
+        <p:fade/>
+      </p:transition>
+    </mc:Choice>
+    <mc:Fallback xmlns="">
+      <p:transition spd="med">
+        <p:fade/>
+      </p:transition>
+    </mc:Fallback>
+  </mc:AlternateContent>
+</p:sld>
+</file>
+
+<file path=ppt/slides/slide19.xml><?xml version="1.0" encoding="utf-8"?>
+<p:sld xmlns:a="http://schemas.openxmlformats.org/drawingml/2006/main" xmlns:r="http://schemas.openxmlformats.org/officeDocument/2006/relationships" xmlns:p="http://schemas.openxmlformats.org/presentationml/2006/main">
+  <p:cSld>
+    <p:spTree>
+      <p:nvGrpSpPr>
+        <p:cNvPr id="1" name=""/>
+        <p:cNvGrpSpPr/>
+        <p:nvPr/>
+      </p:nvGrpSpPr>
+      <p:grpSpPr>
+        <a:xfrm>
+          <a:off x="0" y="0"/>
+          <a:ext cx="0" cy="0"/>
+          <a:chOff x="0" y="0"/>
+          <a:chExt cx="0" cy="0"/>
+        </a:xfrm>
+      </p:grpSpPr>
+      <p:pic>
+        <p:nvPicPr>
+          <p:cNvPr id="2" name="Picture 1"/>
+          <p:cNvPicPr>
+            <a:picLocks noChangeAspect="1"/>
+          </p:cNvPicPr>
+          <p:nvPr/>
+        </p:nvPicPr>
+        <p:blipFill>
+          <a:blip r:embed="rId2">
+            <a:extLst>
+              <a:ext uri="{28A0092B-C50C-407E-A947-70E740481C1C}">
+                <a14:useLocalDpi xmlns:a14="http://schemas.microsoft.com/office/drawing/2010/main" val="0"/>
+              </a:ext>
+            </a:extLst>
+          </a:blip>
+          <a:stretch>
+            <a:fillRect/>
+          </a:stretch>
+        </p:blipFill>
+        <p:spPr>
+          <a:xfrm>
+            <a:off x="1752600" y="152400"/>
+            <a:ext cx="8686800" cy="6595580"/>
+          </a:xfrm>
+          <a:prstGeom prst="rect">
+            <a:avLst/>
+          </a:prstGeom>
+        </p:spPr>
+      </p:pic>
+    </p:spTree>
+    <p:extLst>
+      <p:ext uri="{BB962C8B-B14F-4D97-AF65-F5344CB8AC3E}">
+        <p14:creationId xmlns:p14="http://schemas.microsoft.com/office/powerpoint/2010/main" val="971473018"/>
+      </p:ext>
+    </p:extLst>
+  </p:cSld>
+  <p:clrMapOvr>
+    <a:masterClrMapping/>
+  </p:clrMapOvr>
+  <mc:AlternateContent xmlns:mc="http://schemas.openxmlformats.org/markup-compatibility/2006" xmlns:p14="http://schemas.microsoft.com/office/powerpoint/2010/main">
+    <mc:Choice Requires="p14">
+      <p:transition spd="med" p14:dur="700">
+        <p:fade/>
+      </p:transition>
+    </mc:Choice>
+    <mc:Fallback xmlns="">
+      <p:transition spd="med">
+        <p:fade/>
+      </p:transition>
+    </mc:Fallback>
+  </mc:AlternateContent>
+</p:sld>
+</file>
+
 <file path=ppt/slides/slide2.xml><?xml version="1.0" encoding="utf-8"?>
 <p:sld xmlns:a="http://schemas.openxmlformats.org/drawingml/2006/main" xmlns:r="http://schemas.openxmlformats.org/officeDocument/2006/relationships" xmlns:p="http://schemas.openxmlformats.org/presentationml/2006/main">
   <p:cSld>
@@ -6755,28 +7318,9 @@
             </a:r>
           </a:p>
           <a:p>
-            <a:r>
-              <a:rPr lang="en-US" sz="3200" dirty="0">
-                <a:solidFill>
-                  <a:schemeClr val="tx1"/>
-                </a:solidFill>
-                <a:latin typeface="Cambria" panose="02040503050406030204" pitchFamily="18" charset="0"/>
-              </a:rPr>
-              <a:t>User Side</a:t>
-            </a:r>
-          </a:p>
-          <a:p>
-            <a:r>
-              <a:rPr lang="en-US" sz="3200" dirty="0">
-                <a:solidFill>
-                  <a:schemeClr val="tx1"/>
-                </a:solidFill>
-                <a:latin typeface="Cambria" panose="02040503050406030204" pitchFamily="18" charset="0"/>
-              </a:rPr>
-              <a:t>Admin Side</a:t>
-            </a:r>
-          </a:p>
-          <a:p>
+            <a:pPr marL="0" indent="0">
+              <a:buNone/>
+            </a:pPr>
             <a:endParaRPr lang="en-US" sz="3200" dirty="0">
               <a:solidFill>
                 <a:schemeClr val="tx1"/>
@@ -7161,236 +7705,6 @@
                       </p:childTnLst>
                     </p:cTn>
                   </p:par>
-                  <p:par>
-                    <p:cTn id="24" fill="hold">
-                      <p:stCondLst>
-                        <p:cond delay="indefinite"/>
-                      </p:stCondLst>
-                      <p:childTnLst>
-                        <p:par>
-                          <p:cTn id="25" fill="hold">
-                            <p:stCondLst>
-                              <p:cond delay="0"/>
-                            </p:stCondLst>
-                            <p:childTnLst>
-                              <p:par>
-                                <p:cTn id="26" presetID="42" presetClass="entr" presetSubtype="0" fill="hold" nodeType="clickEffect">
-                                  <p:stCondLst>
-                                    <p:cond delay="0"/>
-                                  </p:stCondLst>
-                                  <p:childTnLst>
-                                    <p:set>
-                                      <p:cBhvr>
-                                        <p:cTn id="27" dur="1" fill="hold">
-                                          <p:stCondLst>
-                                            <p:cond delay="0"/>
-                                          </p:stCondLst>
-                                        </p:cTn>
-                                        <p:tgtEl>
-                                          <p:spTgt spid="3">
-                                            <p:txEl>
-                                              <p:pRg st="3" end="3"/>
-                                            </p:txEl>
-                                          </p:spTgt>
-                                        </p:tgtEl>
-                                        <p:attrNameLst>
-                                          <p:attrName>style.visibility</p:attrName>
-                                        </p:attrNameLst>
-                                      </p:cBhvr>
-                                      <p:to>
-                                        <p:strVal val="visible"/>
-                                      </p:to>
-                                    </p:set>
-                                    <p:animEffect transition="in" filter="fade">
-                                      <p:cBhvr>
-                                        <p:cTn id="28" dur="1000"/>
-                                        <p:tgtEl>
-                                          <p:spTgt spid="3">
-                                            <p:txEl>
-                                              <p:pRg st="3" end="3"/>
-                                            </p:txEl>
-                                          </p:spTgt>
-                                        </p:tgtEl>
-                                      </p:cBhvr>
-                                    </p:animEffect>
-                                    <p:anim calcmode="lin" valueType="num">
-                                      <p:cBhvr>
-                                        <p:cTn id="29" dur="1000" fill="hold"/>
-                                        <p:tgtEl>
-                                          <p:spTgt spid="3">
-                                            <p:txEl>
-                                              <p:pRg st="3" end="3"/>
-                                            </p:txEl>
-                                          </p:spTgt>
-                                        </p:tgtEl>
-                                        <p:attrNameLst>
-                                          <p:attrName>ppt_x</p:attrName>
-                                        </p:attrNameLst>
-                                      </p:cBhvr>
-                                      <p:tavLst>
-                                        <p:tav tm="0">
-                                          <p:val>
-                                            <p:strVal val="#ppt_x"/>
-                                          </p:val>
-                                        </p:tav>
-                                        <p:tav tm="100000">
-                                          <p:val>
-                                            <p:strVal val="#ppt_x"/>
-                                          </p:val>
-                                        </p:tav>
-                                      </p:tavLst>
-                                    </p:anim>
-                                    <p:anim calcmode="lin" valueType="num">
-                                      <p:cBhvr>
-                                        <p:cTn id="30" dur="1000" fill="hold"/>
-                                        <p:tgtEl>
-                                          <p:spTgt spid="3">
-                                            <p:txEl>
-                                              <p:pRg st="3" end="3"/>
-                                            </p:txEl>
-                                          </p:spTgt>
-                                        </p:tgtEl>
-                                        <p:attrNameLst>
-                                          <p:attrName>ppt_y</p:attrName>
-                                        </p:attrNameLst>
-                                      </p:cBhvr>
-                                      <p:tavLst>
-                                        <p:tav tm="0">
-                                          <p:val>
-                                            <p:strVal val="#ppt_y+.1"/>
-                                          </p:val>
-                                        </p:tav>
-                                        <p:tav tm="100000">
-                                          <p:val>
-                                            <p:strVal val="#ppt_y"/>
-                                          </p:val>
-                                        </p:tav>
-                                      </p:tavLst>
-                                    </p:anim>
-                                  </p:childTnLst>
-                                </p:cTn>
-                              </p:par>
-                            </p:childTnLst>
-                          </p:cTn>
-                        </p:par>
-                      </p:childTnLst>
-                    </p:cTn>
-                  </p:par>
-                  <p:par>
-                    <p:cTn id="31" fill="hold">
-                      <p:stCondLst>
-                        <p:cond delay="indefinite"/>
-                      </p:stCondLst>
-                      <p:childTnLst>
-                        <p:par>
-                          <p:cTn id="32" fill="hold">
-                            <p:stCondLst>
-                              <p:cond delay="0"/>
-                            </p:stCondLst>
-                            <p:childTnLst>
-                              <p:par>
-                                <p:cTn id="33" presetID="42" presetClass="entr" presetSubtype="0" fill="hold" nodeType="clickEffect">
-                                  <p:stCondLst>
-                                    <p:cond delay="0"/>
-                                  </p:stCondLst>
-                                  <p:childTnLst>
-                                    <p:set>
-                                      <p:cBhvr>
-                                        <p:cTn id="34" dur="1" fill="hold">
-                                          <p:stCondLst>
-                                            <p:cond delay="0"/>
-                                          </p:stCondLst>
-                                        </p:cTn>
-                                        <p:tgtEl>
-                                          <p:spTgt spid="3">
-                                            <p:txEl>
-                                              <p:pRg st="4" end="4"/>
-                                            </p:txEl>
-                                          </p:spTgt>
-                                        </p:tgtEl>
-                                        <p:attrNameLst>
-                                          <p:attrName>style.visibility</p:attrName>
-                                        </p:attrNameLst>
-                                      </p:cBhvr>
-                                      <p:to>
-                                        <p:strVal val="visible"/>
-                                      </p:to>
-                                    </p:set>
-                                    <p:animEffect transition="in" filter="fade">
-                                      <p:cBhvr>
-                                        <p:cTn id="35" dur="1000"/>
-                                        <p:tgtEl>
-                                          <p:spTgt spid="3">
-                                            <p:txEl>
-                                              <p:pRg st="4" end="4"/>
-                                            </p:txEl>
-                                          </p:spTgt>
-                                        </p:tgtEl>
-                                      </p:cBhvr>
-                                    </p:animEffect>
-                                    <p:anim calcmode="lin" valueType="num">
-                                      <p:cBhvr>
-                                        <p:cTn id="36" dur="1000" fill="hold"/>
-                                        <p:tgtEl>
-                                          <p:spTgt spid="3">
-                                            <p:txEl>
-                                              <p:pRg st="4" end="4"/>
-                                            </p:txEl>
-                                          </p:spTgt>
-                                        </p:tgtEl>
-                                        <p:attrNameLst>
-                                          <p:attrName>ppt_x</p:attrName>
-                                        </p:attrNameLst>
-                                      </p:cBhvr>
-                                      <p:tavLst>
-                                        <p:tav tm="0">
-                                          <p:val>
-                                            <p:strVal val="#ppt_x"/>
-                                          </p:val>
-                                        </p:tav>
-                                        <p:tav tm="100000">
-                                          <p:val>
-                                            <p:strVal val="#ppt_x"/>
-                                          </p:val>
-                                        </p:tav>
-                                      </p:tavLst>
-                                    </p:anim>
-                                    <p:anim calcmode="lin" valueType="num">
-                                      <p:cBhvr>
-                                        <p:cTn id="37" dur="1000" fill="hold"/>
-                                        <p:tgtEl>
-                                          <p:spTgt spid="3">
-                                            <p:txEl>
-                                              <p:pRg st="4" end="4"/>
-                                            </p:txEl>
-                                          </p:spTgt>
-                                        </p:tgtEl>
-                                        <p:attrNameLst>
-                                          <p:attrName>ppt_y</p:attrName>
-                                        </p:attrNameLst>
-                                      </p:cBhvr>
-                                      <p:tavLst>
-                                        <p:tav tm="0">
-                                          <p:val>
-                                            <p:strVal val="#ppt_y+.1"/>
-                                          </p:val>
-                                        </p:tav>
-                                        <p:tav tm="100000">
-                                          <p:val>
-                                            <p:strVal val="#ppt_y"/>
-                                          </p:val>
-                                        </p:tav>
-                                      </p:tavLst>
-                                    </p:anim>
-                                  </p:childTnLst>
-                                </p:cTn>
-                              </p:par>
-                            </p:childTnLst>
-                          </p:cTn>
-                        </p:par>
-                      </p:childTnLst>
-                    </p:cTn>
-                  </p:par>
                 </p:childTnLst>
               </p:cTn>
               <p:prevCondLst>
@@ -7413,6 +7727,222 @@
       </p:par>
     </p:tnLst>
   </p:timing>
+</p:sld>
+</file>
+
+<file path=ppt/slides/slide20.xml><?xml version="1.0" encoding="utf-8"?>
+<p:sld xmlns:a="http://schemas.openxmlformats.org/drawingml/2006/main" xmlns:r="http://schemas.openxmlformats.org/officeDocument/2006/relationships" xmlns:p="http://schemas.openxmlformats.org/presentationml/2006/main">
+  <p:cSld>
+    <p:spTree>
+      <p:nvGrpSpPr>
+        <p:cNvPr id="1" name=""/>
+        <p:cNvGrpSpPr/>
+        <p:nvPr/>
+      </p:nvGrpSpPr>
+      <p:grpSpPr>
+        <a:xfrm>
+          <a:off x="0" y="0"/>
+          <a:ext cx="0" cy="0"/>
+          <a:chOff x="0" y="0"/>
+          <a:chExt cx="0" cy="0"/>
+        </a:xfrm>
+      </p:grpSpPr>
+      <p:pic>
+        <p:nvPicPr>
+          <p:cNvPr id="4" name="Picture 3"/>
+          <p:cNvPicPr>
+            <a:picLocks noChangeAspect="1"/>
+          </p:cNvPicPr>
+          <p:nvPr/>
+        </p:nvPicPr>
+        <p:blipFill>
+          <a:blip r:embed="rId2">
+            <a:extLst>
+              <a:ext uri="{28A0092B-C50C-407E-A947-70E740481C1C}">
+                <a14:useLocalDpi xmlns:a14="http://schemas.microsoft.com/office/drawing/2010/main" val="0"/>
+              </a:ext>
+            </a:extLst>
+          </a:blip>
+          <a:stretch>
+            <a:fillRect/>
+          </a:stretch>
+        </p:blipFill>
+        <p:spPr>
+          <a:xfrm>
+            <a:off x="990600" y="76200"/>
+            <a:ext cx="10210800" cy="6604561"/>
+          </a:xfrm>
+          <a:prstGeom prst="rect">
+            <a:avLst/>
+          </a:prstGeom>
+        </p:spPr>
+      </p:pic>
+    </p:spTree>
+    <p:extLst>
+      <p:ext uri="{BB962C8B-B14F-4D97-AF65-F5344CB8AC3E}">
+        <p14:creationId xmlns:p14="http://schemas.microsoft.com/office/powerpoint/2010/main" val="406124786"/>
+      </p:ext>
+    </p:extLst>
+  </p:cSld>
+  <p:clrMapOvr>
+    <a:masterClrMapping/>
+  </p:clrMapOvr>
+  <mc:AlternateContent xmlns:mc="http://schemas.openxmlformats.org/markup-compatibility/2006" xmlns:p14="http://schemas.microsoft.com/office/powerpoint/2010/main">
+    <mc:Choice Requires="p14">
+      <p:transition spd="med" p14:dur="700">
+        <p:fade/>
+      </p:transition>
+    </mc:Choice>
+    <mc:Fallback xmlns="">
+      <p:transition spd="med">
+        <p:fade/>
+      </p:transition>
+    </mc:Fallback>
+  </mc:AlternateContent>
+</p:sld>
+</file>
+
+<file path=ppt/slides/slide21.xml><?xml version="1.0" encoding="utf-8"?>
+<p:sld xmlns:a="http://schemas.openxmlformats.org/drawingml/2006/main" xmlns:r="http://schemas.openxmlformats.org/officeDocument/2006/relationships" xmlns:p="http://schemas.openxmlformats.org/presentationml/2006/main">
+  <p:cSld>
+    <p:spTree>
+      <p:nvGrpSpPr>
+        <p:cNvPr id="1" name=""/>
+        <p:cNvGrpSpPr/>
+        <p:nvPr/>
+      </p:nvGrpSpPr>
+      <p:grpSpPr>
+        <a:xfrm>
+          <a:off x="0" y="0"/>
+          <a:ext cx="0" cy="0"/>
+          <a:chOff x="0" y="0"/>
+          <a:chExt cx="0" cy="0"/>
+        </a:xfrm>
+      </p:grpSpPr>
+      <p:pic>
+        <p:nvPicPr>
+          <p:cNvPr id="4" name="Picture 3"/>
+          <p:cNvPicPr>
+            <a:picLocks noChangeAspect="1"/>
+          </p:cNvPicPr>
+          <p:nvPr/>
+        </p:nvPicPr>
+        <p:blipFill>
+          <a:blip r:embed="rId2">
+            <a:extLst>
+              <a:ext uri="{28A0092B-C50C-407E-A947-70E740481C1C}">
+                <a14:useLocalDpi xmlns:a14="http://schemas.microsoft.com/office/drawing/2010/main" val="0"/>
+              </a:ext>
+            </a:extLst>
+          </a:blip>
+          <a:stretch>
+            <a:fillRect/>
+          </a:stretch>
+        </p:blipFill>
+        <p:spPr>
+          <a:xfrm>
+            <a:off x="2133600" y="76200"/>
+            <a:ext cx="7696200" cy="6706720"/>
+          </a:xfrm>
+          <a:prstGeom prst="rect">
+            <a:avLst/>
+          </a:prstGeom>
+        </p:spPr>
+      </p:pic>
+    </p:spTree>
+    <p:extLst>
+      <p:ext uri="{BB962C8B-B14F-4D97-AF65-F5344CB8AC3E}">
+        <p14:creationId xmlns:p14="http://schemas.microsoft.com/office/powerpoint/2010/main" val="301864852"/>
+      </p:ext>
+    </p:extLst>
+  </p:cSld>
+  <p:clrMapOvr>
+    <a:masterClrMapping/>
+  </p:clrMapOvr>
+  <mc:AlternateContent xmlns:mc="http://schemas.openxmlformats.org/markup-compatibility/2006" xmlns:p14="http://schemas.microsoft.com/office/powerpoint/2010/main">
+    <mc:Choice Requires="p14">
+      <p:transition spd="med" p14:dur="700">
+        <p:fade/>
+      </p:transition>
+    </mc:Choice>
+    <mc:Fallback xmlns="">
+      <p:transition spd="med">
+        <p:fade/>
+      </p:transition>
+    </mc:Fallback>
+  </mc:AlternateContent>
+</p:sld>
+</file>
+
+<file path=ppt/slides/slide22.xml><?xml version="1.0" encoding="utf-8"?>
+<p:sld xmlns:a="http://schemas.openxmlformats.org/drawingml/2006/main" xmlns:r="http://schemas.openxmlformats.org/officeDocument/2006/relationships" xmlns:p="http://schemas.openxmlformats.org/presentationml/2006/main">
+  <p:cSld>
+    <p:spTree>
+      <p:nvGrpSpPr>
+        <p:cNvPr id="1" name=""/>
+        <p:cNvGrpSpPr/>
+        <p:nvPr/>
+      </p:nvGrpSpPr>
+      <p:grpSpPr>
+        <a:xfrm>
+          <a:off x="0" y="0"/>
+          <a:ext cx="0" cy="0"/>
+          <a:chOff x="0" y="0"/>
+          <a:chExt cx="0" cy="0"/>
+        </a:xfrm>
+      </p:grpSpPr>
+      <p:pic>
+        <p:nvPicPr>
+          <p:cNvPr id="4" name="Picture 3"/>
+          <p:cNvPicPr>
+            <a:picLocks noChangeAspect="1"/>
+          </p:cNvPicPr>
+          <p:nvPr/>
+        </p:nvPicPr>
+        <p:blipFill>
+          <a:blip r:embed="rId2">
+            <a:extLst>
+              <a:ext uri="{28A0092B-C50C-407E-A947-70E740481C1C}">
+                <a14:useLocalDpi xmlns:a14="http://schemas.microsoft.com/office/drawing/2010/main" val="0"/>
+              </a:ext>
+            </a:extLst>
+          </a:blip>
+          <a:stretch>
+            <a:fillRect/>
+          </a:stretch>
+        </p:blipFill>
+        <p:spPr>
+          <a:xfrm>
+            <a:off x="685800" y="152400"/>
+            <a:ext cx="10363200" cy="6553200"/>
+          </a:xfrm>
+          <a:prstGeom prst="rect">
+            <a:avLst/>
+          </a:prstGeom>
+        </p:spPr>
+      </p:pic>
+    </p:spTree>
+    <p:extLst>
+      <p:ext uri="{BB962C8B-B14F-4D97-AF65-F5344CB8AC3E}">
+        <p14:creationId xmlns:p14="http://schemas.microsoft.com/office/powerpoint/2010/main" val="1107159436"/>
+      </p:ext>
+    </p:extLst>
+  </p:cSld>
+  <p:clrMapOvr>
+    <a:masterClrMapping/>
+  </p:clrMapOvr>
+  <mc:AlternateContent xmlns:mc="http://schemas.openxmlformats.org/markup-compatibility/2006" xmlns:p14="http://schemas.microsoft.com/office/powerpoint/2010/main">
+    <mc:Choice Requires="p14">
+      <p:transition spd="med" p14:dur="700">
+        <p:fade/>
+      </p:transition>
+    </mc:Choice>
+    <mc:Fallback xmlns="">
+      <p:transition spd="med">
+        <p:fade/>
+      </p:transition>
+    </mc:Fallback>
+  </mc:AlternateContent>
 </p:sld>
 </file>
 
@@ -8920,8 +9450,23 @@
                 </a:solidFill>
                 <a:latin typeface="Cambria" panose="02040503050406030204" pitchFamily="18" charset="0"/>
               </a:rPr>
-              <a:t>User fills up post</a:t>
-            </a:r>
+              <a:t>User fills up </a:t>
+            </a:r>
+            <a:r>
+              <a:rPr lang="en-US" sz="3600" dirty="0" smtClean="0">
+                <a:solidFill>
+                  <a:schemeClr val="tx1"/>
+                </a:solidFill>
+                <a:latin typeface="Cambria" panose="02040503050406030204" pitchFamily="18" charset="0"/>
+              </a:rPr>
+              <a:t>form</a:t>
+            </a:r>
+            <a:endParaRPr lang="en-US" sz="3600" dirty="0">
+              <a:solidFill>
+                <a:schemeClr val="tx1"/>
+              </a:solidFill>
+              <a:latin typeface="Cambria" panose="02040503050406030204" pitchFamily="18" charset="0"/>
+            </a:endParaRPr>
           </a:p>
           <a:p>
             <a:r>
@@ -8953,7 +9498,25 @@
                 </a:solidFill>
                 <a:latin typeface="Cambria" panose="02040503050406030204" pitchFamily="18" charset="0"/>
               </a:rPr>
-              <a:t>User fills up forms who wants to volunteer</a:t>
+              <a:t>User fills up </a:t>
+            </a:r>
+            <a:r>
+              <a:rPr lang="en-US" sz="3600" dirty="0" smtClean="0">
+                <a:solidFill>
+                  <a:schemeClr val="tx1"/>
+                </a:solidFill>
+                <a:latin typeface="Cambria" panose="02040503050406030204" pitchFamily="18" charset="0"/>
+              </a:rPr>
+              <a:t>forms </a:t>
+            </a:r>
+            <a:r>
+              <a:rPr lang="en-US" sz="3600" dirty="0">
+                <a:solidFill>
+                  <a:schemeClr val="tx1"/>
+                </a:solidFill>
+                <a:latin typeface="Cambria" panose="02040503050406030204" pitchFamily="18" charset="0"/>
+              </a:rPr>
+              <a:t>who wants to volunteer</a:t>
             </a:r>
           </a:p>
           <a:p>
@@ -8975,8 +9538,34 @@
                 </a:solidFill>
                 <a:latin typeface="Cambria" panose="02040503050406030204" pitchFamily="18" charset="0"/>
               </a:rPr>
-              <a:t>User views list of near makeshift morgue</a:t>
-            </a:r>
+              <a:t>User views list of near makeshift </a:t>
+            </a:r>
+            <a:r>
+              <a:rPr lang="en-US" sz="3600" dirty="0" smtClean="0">
+                <a:solidFill>
+                  <a:schemeClr val="tx1"/>
+                </a:solidFill>
+                <a:latin typeface="Cambria" panose="02040503050406030204" pitchFamily="18" charset="0"/>
+              </a:rPr>
+              <a:t>morgue</a:t>
+            </a:r>
+          </a:p>
+          <a:p>
+            <a:r>
+              <a:rPr lang="en-US" sz="3600" dirty="0" smtClean="0">
+                <a:solidFill>
+                  <a:schemeClr val="tx1"/>
+                </a:solidFill>
+                <a:latin typeface="Cambria" panose="02040503050406030204" pitchFamily="18" charset="0"/>
+              </a:rPr>
+              <a:t>Admin requests for transportation of bodies</a:t>
+            </a:r>
+            <a:endParaRPr lang="en-US" sz="3600" dirty="0">
+              <a:solidFill>
+                <a:schemeClr val="tx1"/>
+              </a:solidFill>
+              <a:latin typeface="Cambria" panose="02040503050406030204" pitchFamily="18" charset="0"/>
+            </a:endParaRPr>
           </a:p>
           <a:p>
             <a:r>
@@ -8987,17 +9576,6 @@
                 <a:latin typeface="Cambria" panose="02040503050406030204" pitchFamily="18" charset="0"/>
               </a:rPr>
               <a:t>System summarizes all records</a:t>
-            </a:r>
-          </a:p>
-          <a:p>
-            <a:r>
-              <a:rPr lang="en-US" sz="3600" dirty="0">
-                <a:solidFill>
-                  <a:schemeClr val="tx1"/>
-                </a:solidFill>
-                <a:latin typeface="Cambria" panose="02040503050406030204" pitchFamily="18" charset="0"/>
-              </a:rPr>
-              <a:t>Admin monitor data</a:t>
             </a:r>
           </a:p>
           <a:p>
@@ -10359,19 +10937,23 @@
                 </a:solidFill>
                 <a:latin typeface="Cambria" panose="02040503050406030204" pitchFamily="18" charset="0"/>
               </a:rPr>
-              <a:t>System summarizes all records</a:t>
-            </a:r>
-          </a:p>
-          <a:p>
-            <a:r>
-              <a:rPr lang="en-US" sz="3200" dirty="0">
+              <a:t>System summarizes all </a:t>
+            </a:r>
+            <a:r>
+              <a:rPr lang="en-US" sz="3200" dirty="0" smtClean="0">
                 <a:solidFill>
                   <a:schemeClr val="tx1"/>
                 </a:solidFill>
                 <a:latin typeface="Cambria" panose="02040503050406030204" pitchFamily="18" charset="0"/>
               </a:rPr>
-              <a:t>Admin monitor data</a:t>
-            </a:r>
+              <a:t>records</a:t>
+            </a:r>
+            <a:endParaRPr lang="en-US" sz="3200" dirty="0">
+              <a:solidFill>
+                <a:schemeClr val="tx1"/>
+              </a:solidFill>
+              <a:latin typeface="Cambria" panose="02040503050406030204" pitchFamily="18" charset="0"/>
+            </a:endParaRPr>
           </a:p>
           <a:p>
             <a:endParaRPr lang="en-US" sz="3200" dirty="0">
@@ -10860,121 +11442,6 @@
                                           <p:spTgt spid="3">
                                             <p:txEl>
                                               <p:pRg st="3" end="3"/>
-                                            </p:txEl>
-                                          </p:spTgt>
-                                        </p:tgtEl>
-                                        <p:attrNameLst>
-                                          <p:attrName>ppt_y</p:attrName>
-                                        </p:attrNameLst>
-                                      </p:cBhvr>
-                                      <p:tavLst>
-                                        <p:tav tm="0">
-                                          <p:val>
-                                            <p:strVal val="#ppt_y+.1"/>
-                                          </p:val>
-                                        </p:tav>
-                                        <p:tav tm="100000">
-                                          <p:val>
-                                            <p:strVal val="#ppt_y"/>
-                                          </p:val>
-                                        </p:tav>
-                                      </p:tavLst>
-                                    </p:anim>
-                                  </p:childTnLst>
-                                </p:cTn>
-                              </p:par>
-                            </p:childTnLst>
-                          </p:cTn>
-                        </p:par>
-                      </p:childTnLst>
-                    </p:cTn>
-                  </p:par>
-                  <p:par>
-                    <p:cTn id="31" fill="hold">
-                      <p:stCondLst>
-                        <p:cond delay="indefinite"/>
-                      </p:stCondLst>
-                      <p:childTnLst>
-                        <p:par>
-                          <p:cTn id="32" fill="hold">
-                            <p:stCondLst>
-                              <p:cond delay="0"/>
-                            </p:stCondLst>
-                            <p:childTnLst>
-                              <p:par>
-                                <p:cTn id="33" presetID="42" presetClass="entr" presetSubtype="0" fill="hold" grpId="0" nodeType="clickEffect">
-                                  <p:stCondLst>
-                                    <p:cond delay="0"/>
-                                  </p:stCondLst>
-                                  <p:childTnLst>
-                                    <p:set>
-                                      <p:cBhvr>
-                                        <p:cTn id="34" dur="1" fill="hold">
-                                          <p:stCondLst>
-                                            <p:cond delay="0"/>
-                                          </p:stCondLst>
-                                        </p:cTn>
-                                        <p:tgtEl>
-                                          <p:spTgt spid="3">
-                                            <p:txEl>
-                                              <p:pRg st="4" end="4"/>
-                                            </p:txEl>
-                                          </p:spTgt>
-                                        </p:tgtEl>
-                                        <p:attrNameLst>
-                                          <p:attrName>style.visibility</p:attrName>
-                                        </p:attrNameLst>
-                                      </p:cBhvr>
-                                      <p:to>
-                                        <p:strVal val="visible"/>
-                                      </p:to>
-                                    </p:set>
-                                    <p:animEffect transition="in" filter="fade">
-                                      <p:cBhvr>
-                                        <p:cTn id="35" dur="1000"/>
-                                        <p:tgtEl>
-                                          <p:spTgt spid="3">
-                                            <p:txEl>
-                                              <p:pRg st="4" end="4"/>
-                                            </p:txEl>
-                                          </p:spTgt>
-                                        </p:tgtEl>
-                                      </p:cBhvr>
-                                    </p:animEffect>
-                                    <p:anim calcmode="lin" valueType="num">
-                                      <p:cBhvr>
-                                        <p:cTn id="36" dur="1000" fill="hold"/>
-                                        <p:tgtEl>
-                                          <p:spTgt spid="3">
-                                            <p:txEl>
-                                              <p:pRg st="4" end="4"/>
-                                            </p:txEl>
-                                          </p:spTgt>
-                                        </p:tgtEl>
-                                        <p:attrNameLst>
-                                          <p:attrName>ppt_x</p:attrName>
-                                        </p:attrNameLst>
-                                      </p:cBhvr>
-                                      <p:tavLst>
-                                        <p:tav tm="0">
-                                          <p:val>
-                                            <p:strVal val="#ppt_x"/>
-                                          </p:val>
-                                        </p:tav>
-                                        <p:tav tm="100000">
-                                          <p:val>
-                                            <p:strVal val="#ppt_x"/>
-                                          </p:val>
-                                        </p:tav>
-                                      </p:tavLst>
-                                    </p:anim>
-                                    <p:anim calcmode="lin" valueType="num">
-                                      <p:cBhvr>
-                                        <p:cTn id="37" dur="1000" fill="hold"/>
-                                        <p:tgtEl>
-                                          <p:spTgt spid="3">
-                                            <p:txEl>
-                                              <p:pRg st="4" end="4"/>
                                             </p:txEl>
                                           </p:spTgt>
                                         </p:tgtEl>
@@ -11094,11 +11561,34 @@
         </p:spPr>
         <p:txBody>
           <a:bodyPr>
-            <a:normAutofit/>
+            <a:normAutofit fontScale="92500" lnSpcReduction="10000"/>
           </a:bodyPr>
           <a:lstStyle/>
           <a:p>
+            <a:pPr marL="228600" lvl="1" indent="0" algn="just">
+              <a:buNone/>
+            </a:pPr>
+            <a:r>
+              <a:rPr lang="en-US" sz="3600" dirty="0" smtClean="0">
+                <a:solidFill>
+                  <a:schemeClr val="tx1"/>
+                </a:solidFill>
+                <a:latin typeface="Cambria" panose="02040503050406030204" pitchFamily="18" charset="0"/>
+              </a:rPr>
+              <a:t>Mission of the NDRRMC</a:t>
+            </a:r>
+          </a:p>
+          <a:p>
             <a:pPr lvl="1" algn="just"/>
+            <a:r>
+              <a:rPr lang="en-US" sz="3600" dirty="0" smtClean="0">
+                <a:solidFill>
+                  <a:schemeClr val="tx1"/>
+                </a:solidFill>
+                <a:latin typeface="Cambria" panose="02040503050406030204" pitchFamily="18" charset="0"/>
+              </a:rPr>
+              <a:t>To provide </a:t>
+            </a:r>
             <a:r>
               <a:rPr lang="en-US" sz="3600" dirty="0">
                 <a:solidFill>
@@ -11106,13 +11596,40 @@
                 </a:solidFill>
                 <a:latin typeface="Cambria" panose="02040503050406030204" pitchFamily="18" charset="0"/>
               </a:rPr>
-              <a:t>To help identify people (dead, alive, missing, found)</a:t>
-            </a:r>
+              <a:t>assistance in the proper identification and disposition of the remains in a sanitary manner with cautions to prevent negative psychological and social impact on the bereaved and the community</a:t>
+            </a:r>
+            <a:r>
+              <a:rPr lang="en-US" sz="3600" dirty="0" smtClean="0">
+                <a:solidFill>
+                  <a:schemeClr val="tx1"/>
+                </a:solidFill>
+                <a:latin typeface="Cambria" panose="02040503050406030204" pitchFamily="18" charset="0"/>
+              </a:rPr>
+              <a:t>.</a:t>
+            </a:r>
+          </a:p>
+          <a:p>
+            <a:pPr lvl="1" algn="just"/>
+            <a:endParaRPr lang="en-US" sz="3600" dirty="0" smtClean="0">
+              <a:solidFill>
+                <a:schemeClr val="tx1"/>
+              </a:solidFill>
+              <a:latin typeface="Cambria" panose="02040503050406030204" pitchFamily="18" charset="0"/>
+            </a:endParaRPr>
           </a:p>
           <a:p>
             <a:pPr marL="228600" lvl="1" indent="0" algn="just">
               <a:buNone/>
             </a:pPr>
+            <a:r>
+              <a:rPr lang="en-US" sz="3600" dirty="0" smtClean="0">
+                <a:solidFill>
+                  <a:schemeClr val="tx1"/>
+                </a:solidFill>
+                <a:latin typeface="Cambria" panose="02040503050406030204" pitchFamily="18" charset="0"/>
+              </a:rPr>
+              <a:t>App Objectives</a:t>
+            </a:r>
             <a:endParaRPr lang="en-US" sz="3600" dirty="0">
               <a:solidFill>
                 <a:schemeClr val="tx1"/>
@@ -11123,19 +11640,59 @@
           <a:p>
             <a:pPr lvl="1" algn="just"/>
             <a:r>
+              <a:rPr lang="en-US" sz="3600" dirty="0" smtClean="0">
+                <a:solidFill>
+                  <a:schemeClr val="tx1"/>
+                </a:solidFill>
+                <a:latin typeface="Cambria" panose="02040503050406030204" pitchFamily="18" charset="0"/>
+              </a:rPr>
+              <a:t>To help </a:t>
+            </a:r>
+            <a:r>
               <a:rPr lang="en-US" sz="3600" dirty="0">
                 <a:solidFill>
                   <a:schemeClr val="tx1"/>
                 </a:solidFill>
                 <a:latin typeface="Cambria" panose="02040503050406030204" pitchFamily="18" charset="0"/>
               </a:rPr>
-              <a:t>To easily monitor dead/missing people</a:t>
-            </a:r>
-          </a:p>
-          <a:p>
-            <a:pPr marL="228600" lvl="1" indent="0" algn="just">
-              <a:buNone/>
-            </a:pPr>
+              <a:t>identify people (dead, alive, missing, found</a:t>
+            </a:r>
+            <a:r>
+              <a:rPr lang="en-US" sz="3600" dirty="0" smtClean="0">
+                <a:solidFill>
+                  <a:schemeClr val="tx1"/>
+                </a:solidFill>
+                <a:latin typeface="Cambria" panose="02040503050406030204" pitchFamily="18" charset="0"/>
+              </a:rPr>
+              <a:t>)</a:t>
+            </a:r>
+            <a:endParaRPr lang="en-US" sz="3600" dirty="0">
+              <a:solidFill>
+                <a:schemeClr val="tx1"/>
+              </a:solidFill>
+              <a:latin typeface="Cambria" panose="02040503050406030204" pitchFamily="18" charset="0"/>
+            </a:endParaRPr>
+          </a:p>
+          <a:p>
+            <a:pPr lvl="1" algn="just"/>
+            <a:r>
+              <a:rPr lang="en-US" sz="3600" dirty="0">
+                <a:solidFill>
+                  <a:schemeClr val="tx1"/>
+                </a:solidFill>
+                <a:latin typeface="Cambria" panose="02040503050406030204" pitchFamily="18" charset="0"/>
+              </a:rPr>
+              <a:t>To easily monitor dead/missing </a:t>
+            </a:r>
+            <a:r>
+              <a:rPr lang="en-US" sz="3600" dirty="0" smtClean="0">
+                <a:solidFill>
+                  <a:schemeClr val="tx1"/>
+                </a:solidFill>
+                <a:latin typeface="Cambria" panose="02040503050406030204" pitchFamily="18" charset="0"/>
+              </a:rPr>
+              <a:t>people</a:t>
+            </a:r>
             <a:endParaRPr lang="en-US" sz="3600" dirty="0">
               <a:solidFill>
                 <a:schemeClr val="tx1"/>
@@ -11304,33 +11861,15 @@
                                   </p:childTnLst>
                                 </p:cTn>
                               </p:par>
-                            </p:childTnLst>
-                          </p:cTn>
-                        </p:par>
-                      </p:childTnLst>
-                    </p:cTn>
-                  </p:par>
-                  <p:par>
-                    <p:cTn id="10" fill="hold">
-                      <p:stCondLst>
-                        <p:cond delay="indefinite"/>
-                      </p:stCondLst>
-                      <p:childTnLst>
-                        <p:par>
-                          <p:cTn id="11" fill="hold">
-                            <p:stCondLst>
-                              <p:cond delay="0"/>
-                            </p:stCondLst>
-                            <p:childTnLst>
                               <p:par>
-                                <p:cTn id="12" presetID="42" presetClass="entr" presetSubtype="0" fill="hold" grpId="0" nodeType="clickEffect">
+                                <p:cTn id="10" presetID="42" presetClass="entr" presetSubtype="0" fill="hold" grpId="0" nodeType="withEffect">
                                   <p:stCondLst>
                                     <p:cond delay="0"/>
                                   </p:stCondLst>
                                   <p:childTnLst>
                                     <p:set>
                                       <p:cBhvr>
-                                        <p:cTn id="13" dur="1" fill="hold">
+                                        <p:cTn id="11" dur="1" fill="hold">
                                           <p:stCondLst>
                                             <p:cond delay="0"/>
                                           </p:stCondLst>
@@ -11338,7 +11877,7 @@
                                         <p:tgtEl>
                                           <p:spTgt spid="3">
                                             <p:txEl>
-                                              <p:pRg st="2" end="2"/>
+                                              <p:pRg st="1" end="1"/>
                                             </p:txEl>
                                           </p:spTgt>
                                         </p:tgtEl>
@@ -11352,11 +11891,11 @@
                                     </p:set>
                                     <p:animEffect transition="in" filter="fade">
                                       <p:cBhvr>
-                                        <p:cTn id="14" dur="1000"/>
-                                        <p:tgtEl>
-                                          <p:spTgt spid="3">
-                                            <p:txEl>
-                                              <p:pRg st="2" end="2"/>
+                                        <p:cTn id="12" dur="1000"/>
+                                        <p:tgtEl>
+                                          <p:spTgt spid="3">
+                                            <p:txEl>
+                                              <p:pRg st="1" end="1"/>
                                             </p:txEl>
                                           </p:spTgt>
                                         </p:tgtEl>
@@ -11364,11 +11903,11 @@
                                     </p:animEffect>
                                     <p:anim calcmode="lin" valueType="num">
                                       <p:cBhvr>
-                                        <p:cTn id="15" dur="1000" fill="hold"/>
-                                        <p:tgtEl>
-                                          <p:spTgt spid="3">
-                                            <p:txEl>
-                                              <p:pRg st="2" end="2"/>
+                                        <p:cTn id="13" dur="1000" fill="hold"/>
+                                        <p:tgtEl>
+                                          <p:spTgt spid="3">
+                                            <p:txEl>
+                                              <p:pRg st="1" end="1"/>
                                             </p:txEl>
                                           </p:spTgt>
                                         </p:tgtEl>
@@ -11391,11 +11930,205 @@
                                     </p:anim>
                                     <p:anim calcmode="lin" valueType="num">
                                       <p:cBhvr>
-                                        <p:cTn id="16" dur="1000" fill="hold"/>
-                                        <p:tgtEl>
-                                          <p:spTgt spid="3">
-                                            <p:txEl>
-                                              <p:pRg st="2" end="2"/>
+                                        <p:cTn id="14" dur="1000" fill="hold"/>
+                                        <p:tgtEl>
+                                          <p:spTgt spid="3">
+                                            <p:txEl>
+                                              <p:pRg st="1" end="1"/>
+                                            </p:txEl>
+                                          </p:spTgt>
+                                        </p:tgtEl>
+                                        <p:attrNameLst>
+                                          <p:attrName>ppt_y</p:attrName>
+                                        </p:attrNameLst>
+                                      </p:cBhvr>
+                                      <p:tavLst>
+                                        <p:tav tm="0">
+                                          <p:val>
+                                            <p:strVal val="#ppt_y+.1"/>
+                                          </p:val>
+                                        </p:tav>
+                                        <p:tav tm="100000">
+                                          <p:val>
+                                            <p:strVal val="#ppt_y"/>
+                                          </p:val>
+                                        </p:tav>
+                                      </p:tavLst>
+                                    </p:anim>
+                                  </p:childTnLst>
+                                </p:cTn>
+                              </p:par>
+                              <p:par>
+                                <p:cTn id="15" presetID="42" presetClass="entr" presetSubtype="0" fill="hold" grpId="0" nodeType="withEffect">
+                                  <p:stCondLst>
+                                    <p:cond delay="0"/>
+                                  </p:stCondLst>
+                                  <p:childTnLst>
+                                    <p:set>
+                                      <p:cBhvr>
+                                        <p:cTn id="16" dur="1" fill="hold">
+                                          <p:stCondLst>
+                                            <p:cond delay="0"/>
+                                          </p:stCondLst>
+                                        </p:cTn>
+                                        <p:tgtEl>
+                                          <p:spTgt spid="3">
+                                            <p:txEl>
+                                              <p:pRg st="3" end="3"/>
+                                            </p:txEl>
+                                          </p:spTgt>
+                                        </p:tgtEl>
+                                        <p:attrNameLst>
+                                          <p:attrName>style.visibility</p:attrName>
+                                        </p:attrNameLst>
+                                      </p:cBhvr>
+                                      <p:to>
+                                        <p:strVal val="visible"/>
+                                      </p:to>
+                                    </p:set>
+                                    <p:animEffect transition="in" filter="fade">
+                                      <p:cBhvr>
+                                        <p:cTn id="17" dur="1000"/>
+                                        <p:tgtEl>
+                                          <p:spTgt spid="3">
+                                            <p:txEl>
+                                              <p:pRg st="3" end="3"/>
+                                            </p:txEl>
+                                          </p:spTgt>
+                                        </p:tgtEl>
+                                      </p:cBhvr>
+                                    </p:animEffect>
+                                    <p:anim calcmode="lin" valueType="num">
+                                      <p:cBhvr>
+                                        <p:cTn id="18" dur="1000" fill="hold"/>
+                                        <p:tgtEl>
+                                          <p:spTgt spid="3">
+                                            <p:txEl>
+                                              <p:pRg st="3" end="3"/>
+                                            </p:txEl>
+                                          </p:spTgt>
+                                        </p:tgtEl>
+                                        <p:attrNameLst>
+                                          <p:attrName>ppt_x</p:attrName>
+                                        </p:attrNameLst>
+                                      </p:cBhvr>
+                                      <p:tavLst>
+                                        <p:tav tm="0">
+                                          <p:val>
+                                            <p:strVal val="#ppt_x"/>
+                                          </p:val>
+                                        </p:tav>
+                                        <p:tav tm="100000">
+                                          <p:val>
+                                            <p:strVal val="#ppt_x"/>
+                                          </p:val>
+                                        </p:tav>
+                                      </p:tavLst>
+                                    </p:anim>
+                                    <p:anim calcmode="lin" valueType="num">
+                                      <p:cBhvr>
+                                        <p:cTn id="19" dur="1000" fill="hold"/>
+                                        <p:tgtEl>
+                                          <p:spTgt spid="3">
+                                            <p:txEl>
+                                              <p:pRg st="3" end="3"/>
+                                            </p:txEl>
+                                          </p:spTgt>
+                                        </p:tgtEl>
+                                        <p:attrNameLst>
+                                          <p:attrName>ppt_y</p:attrName>
+                                        </p:attrNameLst>
+                                      </p:cBhvr>
+                                      <p:tavLst>
+                                        <p:tav tm="0">
+                                          <p:val>
+                                            <p:strVal val="#ppt_y+.1"/>
+                                          </p:val>
+                                        </p:tav>
+                                        <p:tav tm="100000">
+                                          <p:val>
+                                            <p:strVal val="#ppt_y"/>
+                                          </p:val>
+                                        </p:tav>
+                                      </p:tavLst>
+                                    </p:anim>
+                                  </p:childTnLst>
+                                </p:cTn>
+                              </p:par>
+                              <p:par>
+                                <p:cTn id="20" presetID="42" presetClass="entr" presetSubtype="0" fill="hold" grpId="0" nodeType="withEffect">
+                                  <p:stCondLst>
+                                    <p:cond delay="0"/>
+                                  </p:stCondLst>
+                                  <p:childTnLst>
+                                    <p:set>
+                                      <p:cBhvr>
+                                        <p:cTn id="21" dur="1" fill="hold">
+                                          <p:stCondLst>
+                                            <p:cond delay="0"/>
+                                          </p:stCondLst>
+                                        </p:cTn>
+                                        <p:tgtEl>
+                                          <p:spTgt spid="3">
+                                            <p:txEl>
+                                              <p:pRg st="4" end="4"/>
+                                            </p:txEl>
+                                          </p:spTgt>
+                                        </p:tgtEl>
+                                        <p:attrNameLst>
+                                          <p:attrName>style.visibility</p:attrName>
+                                        </p:attrNameLst>
+                                      </p:cBhvr>
+                                      <p:to>
+                                        <p:strVal val="visible"/>
+                                      </p:to>
+                                    </p:set>
+                                    <p:animEffect transition="in" filter="fade">
+                                      <p:cBhvr>
+                                        <p:cTn id="22" dur="1000"/>
+                                        <p:tgtEl>
+                                          <p:spTgt spid="3">
+                                            <p:txEl>
+                                              <p:pRg st="4" end="4"/>
+                                            </p:txEl>
+                                          </p:spTgt>
+                                        </p:tgtEl>
+                                      </p:cBhvr>
+                                    </p:animEffect>
+                                    <p:anim calcmode="lin" valueType="num">
+                                      <p:cBhvr>
+                                        <p:cTn id="23" dur="1000" fill="hold"/>
+                                        <p:tgtEl>
+                                          <p:spTgt spid="3">
+                                            <p:txEl>
+                                              <p:pRg st="4" end="4"/>
+                                            </p:txEl>
+                                          </p:spTgt>
+                                        </p:tgtEl>
+                                        <p:attrNameLst>
+                                          <p:attrName>ppt_x</p:attrName>
+                                        </p:attrNameLst>
+                                      </p:cBhvr>
+                                      <p:tavLst>
+                                        <p:tav tm="0">
+                                          <p:val>
+                                            <p:strVal val="#ppt_x"/>
+                                          </p:val>
+                                        </p:tav>
+                                        <p:tav tm="100000">
+                                          <p:val>
+                                            <p:strVal val="#ppt_x"/>
+                                          </p:val>
+                                        </p:tav>
+                                      </p:tavLst>
+                                    </p:anim>
+                                    <p:anim calcmode="lin" valueType="num">
+                                      <p:cBhvr>
+                                        <p:cTn id="24" dur="1000" fill="hold"/>
+                                        <p:tgtEl>
+                                          <p:spTgt spid="3">
+                                            <p:txEl>
+                                              <p:pRg st="4" end="4"/>
                                             </p:txEl>
                                           </p:spTgt>
                                         </p:tgtEl>
@@ -11426,26 +12159,26 @@
                     </p:cTn>
                   </p:par>
                   <p:par>
-                    <p:cTn id="17" fill="hold">
+                    <p:cTn id="25" fill="hold">
                       <p:stCondLst>
                         <p:cond delay="indefinite"/>
                       </p:stCondLst>
                       <p:childTnLst>
                         <p:par>
-                          <p:cTn id="18" fill="hold">
+                          <p:cTn id="26" fill="hold">
                             <p:stCondLst>
                               <p:cond delay="0"/>
                             </p:stCondLst>
                             <p:childTnLst>
                               <p:par>
-                                <p:cTn id="19" presetID="42" presetClass="entr" presetSubtype="0" fill="hold" grpId="0" nodeType="clickEffect">
+                                <p:cTn id="27" presetID="42" presetClass="entr" presetSubtype="0" fill="hold" grpId="0" nodeType="clickEffect">
                                   <p:stCondLst>
                                     <p:cond delay="0"/>
                                   </p:stCondLst>
                                   <p:childTnLst>
                                     <p:set>
                                       <p:cBhvr>
-                                        <p:cTn id="20" dur="1" fill="hold">
+                                        <p:cTn id="28" dur="1" fill="hold">
                                           <p:stCondLst>
                                             <p:cond delay="0"/>
                                           </p:stCondLst>
@@ -11453,7 +12186,7 @@
                                         <p:tgtEl>
                                           <p:spTgt spid="3">
                                             <p:txEl>
-                                              <p:pRg st="4" end="4"/>
+                                              <p:pRg st="5" end="5"/>
                                             </p:txEl>
                                           </p:spTgt>
                                         </p:tgtEl>
@@ -11467,11 +12200,11 @@
                                     </p:set>
                                     <p:animEffect transition="in" filter="fade">
                                       <p:cBhvr>
-                                        <p:cTn id="21" dur="1000"/>
-                                        <p:tgtEl>
-                                          <p:spTgt spid="3">
-                                            <p:txEl>
-                                              <p:pRg st="4" end="4"/>
+                                        <p:cTn id="29" dur="1000"/>
+                                        <p:tgtEl>
+                                          <p:spTgt spid="3">
+                                            <p:txEl>
+                                              <p:pRg st="5" end="5"/>
                                             </p:txEl>
                                           </p:spTgt>
                                         </p:tgtEl>
@@ -11479,11 +12212,11 @@
                                     </p:animEffect>
                                     <p:anim calcmode="lin" valueType="num">
                                       <p:cBhvr>
-                                        <p:cTn id="22" dur="1000" fill="hold"/>
-                                        <p:tgtEl>
-                                          <p:spTgt spid="3">
-                                            <p:txEl>
-                                              <p:pRg st="4" end="4"/>
+                                        <p:cTn id="30" dur="1000" fill="hold"/>
+                                        <p:tgtEl>
+                                          <p:spTgt spid="3">
+                                            <p:txEl>
+                                              <p:pRg st="5" end="5"/>
                                             </p:txEl>
                                           </p:spTgt>
                                         </p:tgtEl>
@@ -11506,11 +12239,126 @@
                                     </p:anim>
                                     <p:anim calcmode="lin" valueType="num">
                                       <p:cBhvr>
-                                        <p:cTn id="23" dur="1000" fill="hold"/>
-                                        <p:tgtEl>
-                                          <p:spTgt spid="3">
-                                            <p:txEl>
-                                              <p:pRg st="4" end="4"/>
+                                        <p:cTn id="31" dur="1000" fill="hold"/>
+                                        <p:tgtEl>
+                                          <p:spTgt spid="3">
+                                            <p:txEl>
+                                              <p:pRg st="5" end="5"/>
+                                            </p:txEl>
+                                          </p:spTgt>
+                                        </p:tgtEl>
+                                        <p:attrNameLst>
+                                          <p:attrName>ppt_y</p:attrName>
+                                        </p:attrNameLst>
+                                      </p:cBhvr>
+                                      <p:tavLst>
+                                        <p:tav tm="0">
+                                          <p:val>
+                                            <p:strVal val="#ppt_y+.1"/>
+                                          </p:val>
+                                        </p:tav>
+                                        <p:tav tm="100000">
+                                          <p:val>
+                                            <p:strVal val="#ppt_y"/>
+                                          </p:val>
+                                        </p:tav>
+                                      </p:tavLst>
+                                    </p:anim>
+                                  </p:childTnLst>
+                                </p:cTn>
+                              </p:par>
+                            </p:childTnLst>
+                          </p:cTn>
+                        </p:par>
+                      </p:childTnLst>
+                    </p:cTn>
+                  </p:par>
+                  <p:par>
+                    <p:cTn id="32" fill="hold">
+                      <p:stCondLst>
+                        <p:cond delay="indefinite"/>
+                      </p:stCondLst>
+                      <p:childTnLst>
+                        <p:par>
+                          <p:cTn id="33" fill="hold">
+                            <p:stCondLst>
+                              <p:cond delay="0"/>
+                            </p:stCondLst>
+                            <p:childTnLst>
+                              <p:par>
+                                <p:cTn id="34" presetID="42" presetClass="entr" presetSubtype="0" fill="hold" grpId="0" nodeType="clickEffect">
+                                  <p:stCondLst>
+                                    <p:cond delay="0"/>
+                                  </p:stCondLst>
+                                  <p:childTnLst>
+                                    <p:set>
+                                      <p:cBhvr>
+                                        <p:cTn id="35" dur="1" fill="hold">
+                                          <p:stCondLst>
+                                            <p:cond delay="0"/>
+                                          </p:stCondLst>
+                                        </p:cTn>
+                                        <p:tgtEl>
+                                          <p:spTgt spid="3">
+                                            <p:txEl>
+                                              <p:pRg st="6" end="6"/>
+                                            </p:txEl>
+                                          </p:spTgt>
+                                        </p:tgtEl>
+                                        <p:attrNameLst>
+                                          <p:attrName>style.visibility</p:attrName>
+                                        </p:attrNameLst>
+                                      </p:cBhvr>
+                                      <p:to>
+                                        <p:strVal val="visible"/>
+                                      </p:to>
+                                    </p:set>
+                                    <p:animEffect transition="in" filter="fade">
+                                      <p:cBhvr>
+                                        <p:cTn id="36" dur="1000"/>
+                                        <p:tgtEl>
+                                          <p:spTgt spid="3">
+                                            <p:txEl>
+                                              <p:pRg st="6" end="6"/>
+                                            </p:txEl>
+                                          </p:spTgt>
+                                        </p:tgtEl>
+                                      </p:cBhvr>
+                                    </p:animEffect>
+                                    <p:anim calcmode="lin" valueType="num">
+                                      <p:cBhvr>
+                                        <p:cTn id="37" dur="1000" fill="hold"/>
+                                        <p:tgtEl>
+                                          <p:spTgt spid="3">
+                                            <p:txEl>
+                                              <p:pRg st="6" end="6"/>
+                                            </p:txEl>
+                                          </p:spTgt>
+                                        </p:tgtEl>
+                                        <p:attrNameLst>
+                                          <p:attrName>ppt_x</p:attrName>
+                                        </p:attrNameLst>
+                                      </p:cBhvr>
+                                      <p:tavLst>
+                                        <p:tav tm="0">
+                                          <p:val>
+                                            <p:strVal val="#ppt_x"/>
+                                          </p:val>
+                                        </p:tav>
+                                        <p:tav tm="100000">
+                                          <p:val>
+                                            <p:strVal val="#ppt_x"/>
+                                          </p:val>
+                                        </p:tav>
+                                      </p:tavLst>
+                                    </p:anim>
+                                    <p:anim calcmode="lin" valueType="num">
+                                      <p:cBhvr>
+                                        <p:cTn id="38" dur="1000" fill="hold"/>
+                                        <p:tgtEl>
+                                          <p:spTgt spid="3">
+                                            <p:txEl>
+                                              <p:pRg st="6" end="6"/>
                                             </p:txEl>
                                           </p:spTgt>
                                         </p:tgtEl>
@@ -11684,9 +12532,15 @@
             </a:endParaRPr>
           </a:p>
           <a:p>
-            <a:pPr marL="0" indent="0">
-              <a:buNone/>
-            </a:pPr>
+            <a:r>
+              <a:rPr lang="en-US" sz="3200" dirty="0" smtClean="0">
+                <a:solidFill>
+                  <a:schemeClr val="tx1"/>
+                </a:solidFill>
+                <a:latin typeface="Cambria" panose="02040503050406030204" pitchFamily="18" charset="0"/>
+              </a:rPr>
+              <a:t>Request for Transportation of Dead Bodies	</a:t>
+            </a:r>
             <a:endParaRPr lang="en-US" sz="3200" dirty="0">
               <a:solidFill>
                 <a:schemeClr val="tx1"/>
@@ -12302,9 +13156,9 @@
                                           </p:stCondLst>
                                         </p:cTn>
                                         <p:tgtEl>
-                                          <p:spTgt spid="4">
-                                            <p:txEl>
-                                              <p:pRg st="0" end="0"/>
+                                          <p:spTgt spid="5">
+                                            <p:txEl>
+                                              <p:pRg st="4" end="4"/>
                                             </p:txEl>
                                           </p:spTgt>
                                         </p:tgtEl>
@@ -12320,9 +13174,9 @@
                                       <p:cBhvr>
                                         <p:cTn id="35" dur="1000"/>
                                         <p:tgtEl>
-                                          <p:spTgt spid="4">
-                                            <p:txEl>
-                                              <p:pRg st="0" end="0"/>
+                                          <p:spTgt spid="5">
+                                            <p:txEl>
+                                              <p:pRg st="4" end="4"/>
                                             </p:txEl>
                                           </p:spTgt>
                                         </p:tgtEl>
@@ -12332,9 +13186,9 @@
                                       <p:cBhvr>
                                         <p:cTn id="36" dur="1000" fill="hold"/>
                                         <p:tgtEl>
-                                          <p:spTgt spid="4">
-                                            <p:txEl>
-                                              <p:pRg st="0" end="0"/>
+                                          <p:spTgt spid="5">
+                                            <p:txEl>
+                                              <p:pRg st="4" end="4"/>
                                             </p:txEl>
                                           </p:spTgt>
                                         </p:tgtEl>
@@ -12359,9 +13213,9 @@
                                       <p:cBhvr>
                                         <p:cTn id="37" dur="1000" fill="hold"/>
                                         <p:tgtEl>
-                                          <p:spTgt spid="4">
-                                            <p:txEl>
-                                              <p:pRg st="0" end="0"/>
+                                          <p:spTgt spid="5">
+                                            <p:txEl>
+                                              <p:pRg st="4" end="4"/>
                                             </p:txEl>
                                           </p:spTgt>
                                         </p:tgtEl>
@@ -12419,7 +13273,7 @@
                                         <p:tgtEl>
                                           <p:spTgt spid="4">
                                             <p:txEl>
-                                              <p:pRg st="1" end="1"/>
+                                              <p:pRg st="0" end="0"/>
                                             </p:txEl>
                                           </p:spTgt>
                                         </p:tgtEl>
@@ -12437,7 +13291,7 @@
                                         <p:tgtEl>
                                           <p:spTgt spid="4">
                                             <p:txEl>
-                                              <p:pRg st="1" end="1"/>
+                                              <p:pRg st="0" end="0"/>
                                             </p:txEl>
                                           </p:spTgt>
                                         </p:tgtEl>
@@ -12449,7 +13303,7 @@
                                         <p:tgtEl>
                                           <p:spTgt spid="4">
                                             <p:txEl>
-                                              <p:pRg st="1" end="1"/>
+                                              <p:pRg st="0" end="0"/>
                                             </p:txEl>
                                           </p:spTgt>
                                         </p:tgtEl>
@@ -12476,7 +13330,7 @@
                                         <p:tgtEl>
                                           <p:spTgt spid="4">
                                             <p:txEl>
-                                              <p:pRg st="1" end="1"/>
+                                              <p:pRg st="0" end="0"/>
                                             </p:txEl>
                                           </p:spTgt>
                                         </p:tgtEl>
@@ -12534,7 +13388,7 @@
                                         <p:tgtEl>
                                           <p:spTgt spid="4">
                                             <p:txEl>
-                                              <p:pRg st="2" end="2"/>
+                                              <p:pRg st="1" end="1"/>
                                             </p:txEl>
                                           </p:spTgt>
                                         </p:tgtEl>
@@ -12552,7 +13406,7 @@
                                         <p:tgtEl>
                                           <p:spTgt spid="4">
                                             <p:txEl>
-                                              <p:pRg st="2" end="2"/>
+                                              <p:pRg st="1" end="1"/>
                                             </p:txEl>
                                           </p:spTgt>
                                         </p:tgtEl>
@@ -12564,7 +13418,7 @@
                                         <p:tgtEl>
                                           <p:spTgt spid="4">
                                             <p:txEl>
-                                              <p:pRg st="2" end="2"/>
+                                              <p:pRg st="1" end="1"/>
                                             </p:txEl>
                                           </p:spTgt>
                                         </p:tgtEl>
@@ -12591,7 +13445,7 @@
                                         <p:tgtEl>
                                           <p:spTgt spid="4">
                                             <p:txEl>
-                                              <p:pRg st="2" end="2"/>
+                                              <p:pRg st="1" end="1"/>
                                             </p:txEl>
                                           </p:spTgt>
                                         </p:tgtEl>
@@ -12649,7 +13503,7 @@
                                         <p:tgtEl>
                                           <p:spTgt spid="4">
                                             <p:txEl>
-                                              <p:pRg st="3" end="3"/>
+                                              <p:pRg st="2" end="2"/>
                                             </p:txEl>
                                           </p:spTgt>
                                         </p:tgtEl>
@@ -12667,7 +13521,7 @@
                                         <p:tgtEl>
                                           <p:spTgt spid="4">
                                             <p:txEl>
-                                              <p:pRg st="3" end="3"/>
+                                              <p:pRg st="2" end="2"/>
                                             </p:txEl>
                                           </p:spTgt>
                                         </p:tgtEl>
@@ -12679,7 +13533,7 @@
                                         <p:tgtEl>
                                           <p:spTgt spid="4">
                                             <p:txEl>
-                                              <p:pRg st="3" end="3"/>
+                                              <p:pRg st="2" end="2"/>
                                             </p:txEl>
                                           </p:spTgt>
                                         </p:tgtEl>
@@ -12703,6 +13557,121 @@
                                     <p:anim calcmode="lin" valueType="num">
                                       <p:cBhvr>
                                         <p:cTn id="58" dur="1000" fill="hold"/>
+                                        <p:tgtEl>
+                                          <p:spTgt spid="4">
+                                            <p:txEl>
+                                              <p:pRg st="2" end="2"/>
+                                            </p:txEl>
+                                          </p:spTgt>
+                                        </p:tgtEl>
+                                        <p:attrNameLst>
+                                          <p:attrName>ppt_y</p:attrName>
+                                        </p:attrNameLst>
+                                      </p:cBhvr>
+                                      <p:tavLst>
+                                        <p:tav tm="0">
+                                          <p:val>
+                                            <p:strVal val="#ppt_y+.1"/>
+                                          </p:val>
+                                        </p:tav>
+                                        <p:tav tm="100000">
+                                          <p:val>
+                                            <p:strVal val="#ppt_y"/>
+                                          </p:val>
+                                        </p:tav>
+                                      </p:tavLst>
+                                    </p:anim>
+                                  </p:childTnLst>
+                                </p:cTn>
+                              </p:par>
+                            </p:childTnLst>
+                          </p:cTn>
+                        </p:par>
+                      </p:childTnLst>
+                    </p:cTn>
+                  </p:par>
+                  <p:par>
+                    <p:cTn id="59" fill="hold">
+                      <p:stCondLst>
+                        <p:cond delay="indefinite"/>
+                      </p:stCondLst>
+                      <p:childTnLst>
+                        <p:par>
+                          <p:cTn id="60" fill="hold">
+                            <p:stCondLst>
+                              <p:cond delay="0"/>
+                            </p:stCondLst>
+                            <p:childTnLst>
+                              <p:par>
+                                <p:cTn id="61" presetID="42" presetClass="entr" presetSubtype="0" fill="hold" nodeType="clickEffect">
+                                  <p:stCondLst>
+                                    <p:cond delay="0"/>
+                                  </p:stCondLst>
+                                  <p:childTnLst>
+                                    <p:set>
+                                      <p:cBhvr>
+                                        <p:cTn id="62" dur="1" fill="hold">
+                                          <p:stCondLst>
+                                            <p:cond delay="0"/>
+                                          </p:stCondLst>
+                                        </p:cTn>
+                                        <p:tgtEl>
+                                          <p:spTgt spid="4">
+                                            <p:txEl>
+                                              <p:pRg st="3" end="3"/>
+                                            </p:txEl>
+                                          </p:spTgt>
+                                        </p:tgtEl>
+                                        <p:attrNameLst>
+                                          <p:attrName>style.visibility</p:attrName>
+                                        </p:attrNameLst>
+                                      </p:cBhvr>
+                                      <p:to>
+                                        <p:strVal val="visible"/>
+                                      </p:to>
+                                    </p:set>
+                                    <p:animEffect transition="in" filter="fade">
+                                      <p:cBhvr>
+                                        <p:cTn id="63" dur="1000"/>
+                                        <p:tgtEl>
+                                          <p:spTgt spid="4">
+                                            <p:txEl>
+                                              <p:pRg st="3" end="3"/>
+                                            </p:txEl>
+                                          </p:spTgt>
+                                        </p:tgtEl>
+                                      </p:cBhvr>
+                                    </p:animEffect>
+                                    <p:anim calcmode="lin" valueType="num">
+                                      <p:cBhvr>
+                                        <p:cTn id="64" dur="1000" fill="hold"/>
+                                        <p:tgtEl>
+                                          <p:spTgt spid="4">
+                                            <p:txEl>
+                                              <p:pRg st="3" end="3"/>
+                                            </p:txEl>
+                                          </p:spTgt>
+                                        </p:tgtEl>
+                                        <p:attrNameLst>
+                                          <p:attrName>ppt_x</p:attrName>
+                                        </p:attrNameLst>
+                                      </p:cBhvr>
+                                      <p:tavLst>
+                                        <p:tav tm="0">
+                                          <p:val>
+                                            <p:strVal val="#ppt_x"/>
+                                          </p:val>
+                                        </p:tav>
+                                        <p:tav tm="100000">
+                                          <p:val>
+                                            <p:strVal val="#ppt_x"/>
+                                          </p:val>
+                                        </p:tav>
+                                      </p:tavLst>
+                                    </p:anim>
+                                    <p:anim calcmode="lin" valueType="num">
+                                      <p:cBhvr>
+                                        <p:cTn id="65" dur="1000" fill="hold"/>
                                         <p:tgtEl>
                                           <p:spTgt spid="4">
                                             <p:txEl>

</xml_diff>